<commit_message>
update empty files https://github.com/ONLYOFFICE/document-templates/commit/dc3f298ddb8932e385cf81563dd4d2c9429d59e2
</commit_message>
<xml_diff>
--- a/onlyoffice_odoo/static/assets/document_templates/nl-NL/new.pptx
+++ b/onlyoffice_odoo/static/assets/document_templates/nl-NL/new.pptx
@@ -142,7 +142,7 @@
       </p:grpSpPr>
       <p:sp>
         <p:nvSpPr>
-          <p:cNvPr id="2" name="Header Placeholder 1"/>
+          <p:cNvPr id="2" name="Tijdelijke aanduiding voor koptekst 1"/>
           <p:cNvSpPr>
             <a:spLocks noGrp="1"/>
           </p:cNvSpPr>
@@ -173,7 +173,7 @@
       </p:sp>
       <p:sp>
         <p:nvSpPr>
-          <p:cNvPr id="3" name="Date Placeholder 2"/>
+          <p:cNvPr id="3" name="Datum tijdelijke aanduiding 2"/>
           <p:cNvSpPr>
             <a:spLocks noGrp="1"/>
           </p:cNvSpPr>
@@ -208,7 +208,7 @@
       </p:sp>
       <p:sp>
         <p:nvSpPr>
-          <p:cNvPr id="4" name="Slide Image Placeholder 3"/>
+          <p:cNvPr id="4" name="Tijdelijke aanduiding voor diaafbeelding 3"/>
           <p:cNvSpPr>
             <a:spLocks noGrp="1" noRot="1" noChangeAspect="1"/>
           </p:cNvSpPr>
@@ -241,7 +241,7 @@
       </p:sp>
       <p:sp>
         <p:nvSpPr>
-          <p:cNvPr id="5" name="Notes Placeholder 4"/>
+          <p:cNvPr id="5" name="Opmerkingen Tijdelijke aanduiding 4"/>
           <p:cNvSpPr>
             <a:spLocks noGrp="1"/>
           </p:cNvSpPr>
@@ -265,43 +265,43 @@
             <a:pPr lvl="0"/>
             <a:r>
               <a:rPr lang="nl-NL" smtClean="0"/>
-              <a:t>Click to edit Master text styles</a:t>
+              <a:t>Klik om de modelstijlen te bewerken</a:t>
             </a:r>
           </a:p>
           <a:p>
             <a:pPr lvl="1"/>
             <a:r>
               <a:rPr lang="nl-NL" smtClean="0"/>
-              <a:t>Second level</a:t>
+              <a:t>Tweede niveau</a:t>
             </a:r>
           </a:p>
           <a:p>
             <a:pPr lvl="2"/>
             <a:r>
               <a:rPr lang="nl-NL" smtClean="0"/>
-              <a:t>Third level</a:t>
+              <a:t>Derde niveau</a:t>
             </a:r>
           </a:p>
           <a:p>
             <a:pPr lvl="3"/>
             <a:r>
               <a:rPr lang="nl-NL" smtClean="0"/>
-              <a:t>Fourth level</a:t>
+              <a:t>Vierde niveau</a:t>
             </a:r>
           </a:p>
           <a:p>
             <a:pPr lvl="4"/>
             <a:r>
               <a:rPr lang="nl-NL" smtClean="0"/>
-              <a:t>Fifth level</a:t>
-            </a:r>
-            <a:endParaRPr lang="nl-NL"/>
-          </a:p>
-        </p:txBody>
-      </p:sp>
-      <p:sp>
-        <p:nvSpPr>
-          <p:cNvPr id="6" name="Footer Placeholder 5"/>
+              <a:t>Vijfde niveau</a:t>
+            </a:r>
+            <a:endParaRPr lang="nl-NL"/>
+          </a:p>
+        </p:txBody>
+      </p:sp>
+      <p:sp>
+        <p:nvSpPr>
+          <p:cNvPr id="6" name="Tijdelijke aanduiding voor voettekst 5"/>
           <p:cNvSpPr>
             <a:spLocks noGrp="1"/>
           </p:cNvSpPr>
@@ -332,7 +332,7 @@
       </p:sp>
       <p:sp>
         <p:nvSpPr>
-          <p:cNvPr id="7" name="Slide Number Placeholder 6"/>
+          <p:cNvPr id="7" name="Tijdelijke aanduiding voor dianummer 6"/>
           <p:cNvSpPr>
             <a:spLocks noGrp="1"/>
           </p:cNvSpPr>
@@ -487,7 +487,7 @@
       </p:grpSpPr>
       <p:sp>
         <p:nvSpPr>
-          <p:cNvPr id="2" name="Slide Image Placeholder 1"/>
+          <p:cNvPr id="2" name="Tijdelijke aanduiding voor diaafbeelding 1"/>
           <p:cNvSpPr>
             <a:spLocks noGrp="1" noRot="1" noChangeAspect="1"/>
           </p:cNvSpPr>
@@ -504,7 +504,7 @@
       </p:sp>
       <p:sp>
         <p:nvSpPr>
-          <p:cNvPr id="3" name="Notes Placeholder 2"/>
+          <p:cNvPr id="3" name="Opmerkingen Tijdelijke aanduiding 2"/>
           <p:cNvSpPr>
             <a:spLocks noGrp="1"/>
           </p:cNvSpPr>
@@ -526,7 +526,7 @@
       </p:sp>
       <p:sp>
         <p:nvSpPr>
-          <p:cNvPr id="4" name="Slide Number Placeholder 3"/>
+          <p:cNvPr id="4" name="Tijdelijke aanduiding voor dianummer 3"/>
           <p:cNvSpPr>
             <a:spLocks noGrp="1"/>
           </p:cNvSpPr>
@@ -562,7 +562,7 @@
 
 <file path=ppt/slideLayouts/slideLayout1.xml><?xml version="1.0" encoding="utf-8"?>
 <p:sldLayout xmlns:a="http://schemas.openxmlformats.org/drawingml/2006/main" xmlns:r="http://schemas.openxmlformats.org/officeDocument/2006/relationships" xmlns:p="http://schemas.openxmlformats.org/presentationml/2006/main" type="title" preserve="1">
-  <p:cSld name="Úvodná snímka">
+  <p:cSld name="Titeldia">
     <p:spTree>
       <p:nvGrpSpPr>
         <p:cNvPr id="1" name=""/>
@@ -579,7 +579,7 @@
       </p:grpSpPr>
       <p:sp>
         <p:nvSpPr>
-          <p:cNvPr id="2" name="Nadpis 1"/>
+          <p:cNvPr id="2" name="Titel 1"/>
           <p:cNvSpPr>
             <a:spLocks noGrp="1"/>
           </p:cNvSpPr>
@@ -603,14 +603,14 @@
           <a:p>
             <a:r>
               <a:rPr lang="nl-NL"/>
-              <a:t>Upravte štýly predlohy textu</a:t>
-            </a:r>
-          </a:p>
-        </p:txBody>
-      </p:sp>
-      <p:sp>
-        <p:nvSpPr>
-          <p:cNvPr id="3" name="Podnadpis 2"/>
+              <a:t>Klik om de stijl te bewerken</a:t>
+            </a:r>
+          </a:p>
+        </p:txBody>
+      </p:sp>
+      <p:sp>
+        <p:nvSpPr>
+          <p:cNvPr id="3" name="Ondertitel 2"/>
           <p:cNvSpPr>
             <a:spLocks noGrp="1"/>
           </p:cNvSpPr>
@@ -667,14 +667,14 @@
           <a:p>
             <a:r>
               <a:rPr lang="nl-NL"/>
-              <a:t>Upravte štýl predlohy podnadpisov</a:t>
-            </a:r>
-          </a:p>
-        </p:txBody>
-      </p:sp>
-      <p:sp>
-        <p:nvSpPr>
-          <p:cNvPr id="4" name="Zástupný symbol dátumu 3"/>
+              <a:t>Klik om de ondertitelstijl van het model te bewerken</a:t>
+            </a:r>
+          </a:p>
+        </p:txBody>
+      </p:sp>
+      <p:sp>
+        <p:nvSpPr>
+          <p:cNvPr id="4" name="Tijdelijke aanduiding voor datum 3"/>
           <p:cNvSpPr>
             <a:spLocks noGrp="1"/>
           </p:cNvSpPr>
@@ -697,7 +697,7 @@
       </p:sp>
       <p:sp>
         <p:nvSpPr>
-          <p:cNvPr id="5" name="Zástupný symbol päty 4"/>
+          <p:cNvPr id="5" name="Tijdelijke aanduiding voor voettekst 4"/>
           <p:cNvSpPr>
             <a:spLocks noGrp="1"/>
           </p:cNvSpPr>
@@ -716,7 +716,7 @@
       </p:sp>
       <p:sp>
         <p:nvSpPr>
-          <p:cNvPr id="6" name="Zástupný symbol čísla snímky 5"/>
+          <p:cNvPr id="6" name="Tijdelijke aanduiding voor dianummer 5"/>
           <p:cNvSpPr>
             <a:spLocks noGrp="1"/>
           </p:cNvSpPr>
@@ -752,7 +752,7 @@
 
 <file path=ppt/slideLayouts/slideLayout10.xml><?xml version="1.0" encoding="utf-8"?>
 <p:sldLayout xmlns:a="http://schemas.openxmlformats.org/drawingml/2006/main" xmlns:r="http://schemas.openxmlformats.org/officeDocument/2006/relationships" xmlns:p="http://schemas.openxmlformats.org/presentationml/2006/main" type="vertTx" preserve="1">
-  <p:cSld name="Nadpis a zvislý text">
+  <p:cSld name="Titel en verticale tekst">
     <p:spTree>
       <p:nvGrpSpPr>
         <p:cNvPr id="1" name=""/>
@@ -769,7 +769,7 @@
       </p:grpSpPr>
       <p:sp>
         <p:nvSpPr>
-          <p:cNvPr id="2" name="Nadpis 1"/>
+          <p:cNvPr id="2" name="Titel 1"/>
           <p:cNvSpPr>
             <a:spLocks noGrp="1"/>
           </p:cNvSpPr>
@@ -784,14 +784,14 @@
           <a:p>
             <a:r>
               <a:rPr lang="nl-NL"/>
-              <a:t>Upravte štýly predlohy textu</a:t>
-            </a:r>
-          </a:p>
-        </p:txBody>
-      </p:sp>
-      <p:sp>
-        <p:nvSpPr>
-          <p:cNvPr id="3" name="Zástupný symbol zvislého textu 2"/>
+              <a:t>Klik om de stijl te bewerken</a:t>
+            </a:r>
+          </a:p>
+        </p:txBody>
+      </p:sp>
+      <p:sp>
+        <p:nvSpPr>
+          <p:cNvPr id="3" name="Tijdelijke aanduiding voor verticale tekst 2"/>
           <p:cNvSpPr>
             <a:spLocks noGrp="1"/>
           </p:cNvSpPr>
@@ -807,42 +807,42 @@
             <a:pPr lvl="0"/>
             <a:r>
               <a:rPr lang="nl-NL"/>
-              <a:t>Upravte štýl predlohy textu.</a:t>
+              <a:t>Klik om de modelstijlen te bewerken</a:t>
             </a:r>
           </a:p>
           <a:p>
             <a:pPr lvl="1"/>
             <a:r>
               <a:rPr lang="nl-NL"/>
-              <a:t>Druhá úroveň</a:t>
+              <a:t>Tweede niveau</a:t>
             </a:r>
           </a:p>
           <a:p>
             <a:pPr lvl="2"/>
             <a:r>
               <a:rPr lang="nl-NL"/>
-              <a:t>Tretia úroveň</a:t>
+              <a:t>Derde niveau</a:t>
             </a:r>
           </a:p>
           <a:p>
             <a:pPr lvl="3"/>
             <a:r>
               <a:rPr lang="nl-NL"/>
-              <a:t>Štvrtá úroveň</a:t>
+              <a:t>Vierde niveau</a:t>
             </a:r>
           </a:p>
           <a:p>
             <a:pPr lvl="4"/>
             <a:r>
               <a:rPr lang="nl-NL"/>
-              <a:t>Piata úroveň</a:t>
-            </a:r>
-          </a:p>
-        </p:txBody>
-      </p:sp>
-      <p:sp>
-        <p:nvSpPr>
-          <p:cNvPr id="4" name="Zástupný symbol dátumu 3"/>
+              <a:t>Vijfde niveau</a:t>
+            </a:r>
+          </a:p>
+        </p:txBody>
+      </p:sp>
+      <p:sp>
+        <p:nvSpPr>
+          <p:cNvPr id="4" name="Tijdelijke aanduiding voor datum 3"/>
           <p:cNvSpPr>
             <a:spLocks noGrp="1"/>
           </p:cNvSpPr>
@@ -865,7 +865,7 @@
       </p:sp>
       <p:sp>
         <p:nvSpPr>
-          <p:cNvPr id="5" name="Zástupný symbol päty 4"/>
+          <p:cNvPr id="5" name="Tijdelijke aanduiding voor voettekst 4"/>
           <p:cNvSpPr>
             <a:spLocks noGrp="1"/>
           </p:cNvSpPr>
@@ -884,7 +884,7 @@
       </p:sp>
       <p:sp>
         <p:nvSpPr>
-          <p:cNvPr id="6" name="Zástupný symbol čísla snímky 5"/>
+          <p:cNvPr id="6" name="Tijdelijke aanduiding voor dianummer 5"/>
           <p:cNvSpPr>
             <a:spLocks noGrp="1"/>
           </p:cNvSpPr>
@@ -920,7 +920,7 @@
 
 <file path=ppt/slideLayouts/slideLayout11.xml><?xml version="1.0" encoding="utf-8"?>
 <p:sldLayout xmlns:a="http://schemas.openxmlformats.org/drawingml/2006/main" xmlns:r="http://schemas.openxmlformats.org/officeDocument/2006/relationships" xmlns:p="http://schemas.openxmlformats.org/presentationml/2006/main" type="vertTitleAndTx" preserve="1">
-  <p:cSld name="Zvislý nadpis a text">
+  <p:cSld name="Verticale titel en tekst">
     <p:spTree>
       <p:nvGrpSpPr>
         <p:cNvPr id="1" name=""/>
@@ -937,7 +937,7 @@
       </p:grpSpPr>
       <p:sp>
         <p:nvSpPr>
-          <p:cNvPr id="2" name="Zvislý nadpis 1"/>
+          <p:cNvPr id="2" name="Verticale titel 1"/>
           <p:cNvSpPr>
             <a:spLocks noGrp="1"/>
           </p:cNvSpPr>
@@ -957,14 +957,14 @@
           <a:p>
             <a:r>
               <a:rPr lang="nl-NL"/>
-              <a:t>Upravte štýly predlohy textu</a:t>
-            </a:r>
-          </a:p>
-        </p:txBody>
-      </p:sp>
-      <p:sp>
-        <p:nvSpPr>
-          <p:cNvPr id="3" name="Zástupný symbol zvislého textu 2"/>
+              <a:t>Klik om de stijl te bewerken</a:t>
+            </a:r>
+          </a:p>
+        </p:txBody>
+      </p:sp>
+      <p:sp>
+        <p:nvSpPr>
+          <p:cNvPr id="3" name="Tijdelijke aanduiding voor verticale tekst 2"/>
           <p:cNvSpPr>
             <a:spLocks noGrp="1"/>
           </p:cNvSpPr>
@@ -985,42 +985,42 @@
             <a:pPr lvl="0"/>
             <a:r>
               <a:rPr lang="nl-NL"/>
-              <a:t>Upravte štýl predlohy textu.</a:t>
+              <a:t>Klik om de modelstijlen te bewerken</a:t>
             </a:r>
           </a:p>
           <a:p>
             <a:pPr lvl="1"/>
             <a:r>
               <a:rPr lang="nl-NL"/>
-              <a:t>Druhá úroveň</a:t>
+              <a:t>Tweede niveau</a:t>
             </a:r>
           </a:p>
           <a:p>
             <a:pPr lvl="2"/>
             <a:r>
               <a:rPr lang="nl-NL"/>
-              <a:t>Tretia úroveň</a:t>
+              <a:t>Derde niveau</a:t>
             </a:r>
           </a:p>
           <a:p>
             <a:pPr lvl="3"/>
             <a:r>
               <a:rPr lang="nl-NL"/>
-              <a:t>Štvrtá úroveň</a:t>
+              <a:t>Vierde niveau</a:t>
             </a:r>
           </a:p>
           <a:p>
             <a:pPr lvl="4"/>
             <a:r>
               <a:rPr lang="nl-NL"/>
-              <a:t>Piata úroveň</a:t>
-            </a:r>
-          </a:p>
-        </p:txBody>
-      </p:sp>
-      <p:sp>
-        <p:nvSpPr>
-          <p:cNvPr id="4" name="Zástupný symbol dátumu 3"/>
+              <a:t>Vijfde niveau</a:t>
+            </a:r>
+          </a:p>
+        </p:txBody>
+      </p:sp>
+      <p:sp>
+        <p:nvSpPr>
+          <p:cNvPr id="4" name="Tijdelijke aanduiding voor datum 3"/>
           <p:cNvSpPr>
             <a:spLocks noGrp="1"/>
           </p:cNvSpPr>
@@ -1043,7 +1043,7 @@
       </p:sp>
       <p:sp>
         <p:nvSpPr>
-          <p:cNvPr id="5" name="Zástupný symbol päty 4"/>
+          <p:cNvPr id="5" name="Tijdelijke aanduiding voor voettekst 4"/>
           <p:cNvSpPr>
             <a:spLocks noGrp="1"/>
           </p:cNvSpPr>
@@ -1062,7 +1062,7 @@
       </p:sp>
       <p:sp>
         <p:nvSpPr>
-          <p:cNvPr id="6" name="Zástupný symbol čísla snímky 5"/>
+          <p:cNvPr id="6" name="Tijdelijke aanduiding voor dianummer 5"/>
           <p:cNvSpPr>
             <a:spLocks noGrp="1"/>
           </p:cNvSpPr>
@@ -1098,7 +1098,7 @@
 
 <file path=ppt/slideLayouts/slideLayout2.xml><?xml version="1.0" encoding="utf-8"?>
 <p:sldLayout xmlns:a="http://schemas.openxmlformats.org/drawingml/2006/main" xmlns:r="http://schemas.openxmlformats.org/officeDocument/2006/relationships" xmlns:p="http://schemas.openxmlformats.org/presentationml/2006/main" type="obj" preserve="1">
-  <p:cSld name="Nadpis a obsah">
+  <p:cSld name="Titel en object">
     <p:spTree>
       <p:nvGrpSpPr>
         <p:cNvPr id="1" name=""/>
@@ -1115,7 +1115,7 @@
       </p:grpSpPr>
       <p:sp>
         <p:nvSpPr>
-          <p:cNvPr id="2" name="Nadpis 1"/>
+          <p:cNvPr id="2" name="Titel 1"/>
           <p:cNvSpPr>
             <a:spLocks noGrp="1"/>
           </p:cNvSpPr>
@@ -1130,14 +1130,14 @@
           <a:p>
             <a:r>
               <a:rPr lang="nl-NL"/>
-              <a:t>Upravte štýly predlohy textu</a:t>
-            </a:r>
-          </a:p>
-        </p:txBody>
-      </p:sp>
-      <p:sp>
-        <p:nvSpPr>
-          <p:cNvPr id="3" name="Zástupný symbol obsahu 2"/>
+              <a:t>Klik om de stijl te bewerken</a:t>
+            </a:r>
+          </a:p>
+        </p:txBody>
+      </p:sp>
+      <p:sp>
+        <p:nvSpPr>
+          <p:cNvPr id="3" name="Tijdelijke aanduiding voor inhoud 2"/>
           <p:cNvSpPr>
             <a:spLocks noGrp="1"/>
           </p:cNvSpPr>
@@ -1153,42 +1153,42 @@
             <a:pPr lvl="0"/>
             <a:r>
               <a:rPr lang="nl-NL"/>
-              <a:t>Upravte štýl predlohy textu.</a:t>
+              <a:t>Klik om de modelstijlen te bewerken</a:t>
             </a:r>
           </a:p>
           <a:p>
             <a:pPr lvl="1"/>
             <a:r>
               <a:rPr lang="nl-NL"/>
-              <a:t>Druhá úroveň</a:t>
+              <a:t>Tweede niveau</a:t>
             </a:r>
           </a:p>
           <a:p>
             <a:pPr lvl="2"/>
             <a:r>
               <a:rPr lang="nl-NL"/>
-              <a:t>Tretia úroveň</a:t>
+              <a:t>Derde niveau</a:t>
             </a:r>
           </a:p>
           <a:p>
             <a:pPr lvl="3"/>
             <a:r>
               <a:rPr lang="nl-NL"/>
-              <a:t>Štvrtá úroveň</a:t>
+              <a:t>Vierde niveau</a:t>
             </a:r>
           </a:p>
           <a:p>
             <a:pPr lvl="4"/>
             <a:r>
               <a:rPr lang="nl-NL"/>
-              <a:t>Piata úroveň</a:t>
-            </a:r>
-          </a:p>
-        </p:txBody>
-      </p:sp>
-      <p:sp>
-        <p:nvSpPr>
-          <p:cNvPr id="4" name="Zástupný symbol dátumu 3"/>
+              <a:t>Vijfde niveau</a:t>
+            </a:r>
+          </a:p>
+        </p:txBody>
+      </p:sp>
+      <p:sp>
+        <p:nvSpPr>
+          <p:cNvPr id="4" name="Tijdelijke aanduiding voor datum 3"/>
           <p:cNvSpPr>
             <a:spLocks noGrp="1"/>
           </p:cNvSpPr>
@@ -1211,7 +1211,7 @@
       </p:sp>
       <p:sp>
         <p:nvSpPr>
-          <p:cNvPr id="5" name="Zástupný symbol päty 4"/>
+          <p:cNvPr id="5" name="Tijdelijke aanduiding voor voettekst 4"/>
           <p:cNvSpPr>
             <a:spLocks noGrp="1"/>
           </p:cNvSpPr>
@@ -1230,7 +1230,7 @@
       </p:sp>
       <p:sp>
         <p:nvSpPr>
-          <p:cNvPr id="6" name="Zástupný symbol čísla snímky 5"/>
+          <p:cNvPr id="6" name="Tijdelijke aanduiding voor dianummer 5"/>
           <p:cNvSpPr>
             <a:spLocks noGrp="1"/>
           </p:cNvSpPr>
@@ -1266,7 +1266,7 @@
 
 <file path=ppt/slideLayouts/slideLayout3.xml><?xml version="1.0" encoding="utf-8"?>
 <p:sldLayout xmlns:a="http://schemas.openxmlformats.org/drawingml/2006/main" xmlns:r="http://schemas.openxmlformats.org/officeDocument/2006/relationships" xmlns:p="http://schemas.openxmlformats.org/presentationml/2006/main" type="secHead" preserve="1">
-  <p:cSld name="Hlavička sekcie">
+  <p:cSld name="Sectiekop">
     <p:spTree>
       <p:nvGrpSpPr>
         <p:cNvPr id="1" name=""/>
@@ -1283,7 +1283,7 @@
       </p:grpSpPr>
       <p:sp>
         <p:nvSpPr>
-          <p:cNvPr id="2" name="Nadpis 1"/>
+          <p:cNvPr id="2" name="Titel 1"/>
           <p:cNvSpPr>
             <a:spLocks noGrp="1"/>
           </p:cNvSpPr>
@@ -1307,14 +1307,14 @@
           <a:p>
             <a:r>
               <a:rPr lang="nl-NL"/>
-              <a:t>Upravte štýly predlohy textu</a:t>
-            </a:r>
-          </a:p>
-        </p:txBody>
-      </p:sp>
-      <p:sp>
-        <p:nvSpPr>
-          <p:cNvPr id="3" name="Zástupný symbol textu 2"/>
+              <a:t>Klik om de stijl te bewerken</a:t>
+            </a:r>
+          </a:p>
+        </p:txBody>
+      </p:sp>
+      <p:sp>
+        <p:nvSpPr>
+          <p:cNvPr id="3" name="Tijdelijke aanduiding voor tekst 2"/>
           <p:cNvSpPr>
             <a:spLocks noGrp="1"/>
           </p:cNvSpPr>
@@ -1426,14 +1426,14 @@
             <a:pPr lvl="0"/>
             <a:r>
               <a:rPr lang="nl-NL"/>
-              <a:t>Upravte štýl predlohy textu.</a:t>
-            </a:r>
-          </a:p>
-        </p:txBody>
-      </p:sp>
-      <p:sp>
-        <p:nvSpPr>
-          <p:cNvPr id="4" name="Zástupný symbol dátumu 3"/>
+              <a:t>Klik om de modelstijlen te bewerken</a:t>
+            </a:r>
+          </a:p>
+        </p:txBody>
+      </p:sp>
+      <p:sp>
+        <p:nvSpPr>
+          <p:cNvPr id="4" name="Tijdelijke aanduiding voor datum 3"/>
           <p:cNvSpPr>
             <a:spLocks noGrp="1"/>
           </p:cNvSpPr>
@@ -1456,7 +1456,7 @@
       </p:sp>
       <p:sp>
         <p:nvSpPr>
-          <p:cNvPr id="5" name="Zástupný symbol päty 4"/>
+          <p:cNvPr id="5" name="Tijdelijke aanduiding voor voettekst 4"/>
           <p:cNvSpPr>
             <a:spLocks noGrp="1"/>
           </p:cNvSpPr>
@@ -1475,7 +1475,7 @@
       </p:sp>
       <p:sp>
         <p:nvSpPr>
-          <p:cNvPr id="6" name="Zástupný symbol čísla snímky 5"/>
+          <p:cNvPr id="6" name="Tijdelijke aanduiding voor dianummer 5"/>
           <p:cNvSpPr>
             <a:spLocks noGrp="1"/>
           </p:cNvSpPr>
@@ -1511,7 +1511,7 @@
 
 <file path=ppt/slideLayouts/slideLayout4.xml><?xml version="1.0" encoding="utf-8"?>
 <p:sldLayout xmlns:a="http://schemas.openxmlformats.org/drawingml/2006/main" xmlns:r="http://schemas.openxmlformats.org/officeDocument/2006/relationships" xmlns:p="http://schemas.openxmlformats.org/presentationml/2006/main" type="twoObj" preserve="1">
-  <p:cSld name="Dva obsahy">
+  <p:cSld name="Inhoud van twee">
     <p:spTree>
       <p:nvGrpSpPr>
         <p:cNvPr id="1" name=""/>
@@ -1528,7 +1528,7 @@
       </p:grpSpPr>
       <p:sp>
         <p:nvSpPr>
-          <p:cNvPr id="2" name="Nadpis 1"/>
+          <p:cNvPr id="2" name="Titel 1"/>
           <p:cNvSpPr>
             <a:spLocks noGrp="1"/>
           </p:cNvSpPr>
@@ -1543,14 +1543,14 @@
           <a:p>
             <a:r>
               <a:rPr lang="nl-NL"/>
-              <a:t>Upravte štýly predlohy textu</a:t>
-            </a:r>
-          </a:p>
-        </p:txBody>
-      </p:sp>
-      <p:sp>
-        <p:nvSpPr>
-          <p:cNvPr id="3" name="Zástupný symbol obsahu 2"/>
+              <a:t>Klik om de stijl te bewerken</a:t>
+            </a:r>
+          </a:p>
+        </p:txBody>
+      </p:sp>
+      <p:sp>
+        <p:nvSpPr>
+          <p:cNvPr id="3" name="Tijdelijke aanduiding voor inhoud 2"/>
           <p:cNvSpPr>
             <a:spLocks noGrp="1"/>
           </p:cNvSpPr>
@@ -1571,42 +1571,42 @@
             <a:pPr lvl="0"/>
             <a:r>
               <a:rPr lang="nl-NL"/>
-              <a:t>Upravte štýl predlohy textu.</a:t>
+              <a:t>Klik om de modelstijlen te bewerken</a:t>
             </a:r>
           </a:p>
           <a:p>
             <a:pPr lvl="1"/>
             <a:r>
               <a:rPr lang="nl-NL"/>
-              <a:t>Druhá úroveň</a:t>
+              <a:t>Tweede niveau</a:t>
             </a:r>
           </a:p>
           <a:p>
             <a:pPr lvl="2"/>
             <a:r>
               <a:rPr lang="nl-NL"/>
-              <a:t>Tretia úroveň</a:t>
+              <a:t>Derde niveau</a:t>
             </a:r>
           </a:p>
           <a:p>
             <a:pPr lvl="3"/>
             <a:r>
               <a:rPr lang="nl-NL"/>
-              <a:t>Štvrtá úroveň</a:t>
+              <a:t>Vierde niveau</a:t>
             </a:r>
           </a:p>
           <a:p>
             <a:pPr lvl="4"/>
             <a:r>
               <a:rPr lang="nl-NL"/>
-              <a:t>Piata úroveň</a:t>
-            </a:r>
-          </a:p>
-        </p:txBody>
-      </p:sp>
-      <p:sp>
-        <p:nvSpPr>
-          <p:cNvPr id="4" name="Zástupný symbol obsahu 3"/>
+              <a:t>Vijfde niveau</a:t>
+            </a:r>
+          </a:p>
+        </p:txBody>
+      </p:sp>
+      <p:sp>
+        <p:nvSpPr>
+          <p:cNvPr id="4" name="Tijdelijke aanduiding voor inhoud 3"/>
           <p:cNvSpPr>
             <a:spLocks noGrp="1"/>
           </p:cNvSpPr>
@@ -1627,42 +1627,42 @@
             <a:pPr lvl="0"/>
             <a:r>
               <a:rPr lang="nl-NL"/>
-              <a:t>Upravte štýl predlohy textu.</a:t>
+              <a:t>Klik om de modelstijlen te bewerken</a:t>
             </a:r>
           </a:p>
           <a:p>
             <a:pPr lvl="1"/>
             <a:r>
               <a:rPr lang="nl-NL"/>
-              <a:t>Druhá úroveň</a:t>
+              <a:t>Tweede niveau</a:t>
             </a:r>
           </a:p>
           <a:p>
             <a:pPr lvl="2"/>
             <a:r>
               <a:rPr lang="nl-NL"/>
-              <a:t>Tretia úroveň</a:t>
+              <a:t>Derde niveau</a:t>
             </a:r>
           </a:p>
           <a:p>
             <a:pPr lvl="3"/>
             <a:r>
               <a:rPr lang="nl-NL"/>
-              <a:t>Štvrtá úroveň</a:t>
+              <a:t>Vierde niveau</a:t>
             </a:r>
           </a:p>
           <a:p>
             <a:pPr lvl="4"/>
             <a:r>
               <a:rPr lang="nl-NL"/>
-              <a:t>Piata úroveň</a:t>
-            </a:r>
-          </a:p>
-        </p:txBody>
-      </p:sp>
-      <p:sp>
-        <p:nvSpPr>
-          <p:cNvPr id="5" name="Zástupný symbol dátumu 4"/>
+              <a:t>Vijfde niveau</a:t>
+            </a:r>
+          </a:p>
+        </p:txBody>
+      </p:sp>
+      <p:sp>
+        <p:nvSpPr>
+          <p:cNvPr id="5" name="Tijdelijke aanduiding voor datum 4"/>
           <p:cNvSpPr>
             <a:spLocks noGrp="1"/>
           </p:cNvSpPr>
@@ -1685,7 +1685,7 @@
       </p:sp>
       <p:sp>
         <p:nvSpPr>
-          <p:cNvPr id="6" name="Zástupný symbol päty 5"/>
+          <p:cNvPr id="6" name="Tijdelijke aanduiding voor voettekst 5"/>
           <p:cNvSpPr>
             <a:spLocks noGrp="1"/>
           </p:cNvSpPr>
@@ -1704,7 +1704,7 @@
       </p:sp>
       <p:sp>
         <p:nvSpPr>
-          <p:cNvPr id="7" name="Zástupný symbol čísla snímky 6"/>
+          <p:cNvPr id="7" name="Tijdelijke aanduiding voor dianummer 6"/>
           <p:cNvSpPr>
             <a:spLocks noGrp="1"/>
           </p:cNvSpPr>
@@ -1740,7 +1740,7 @@
 
 <file path=ppt/slideLayouts/slideLayout5.xml><?xml version="1.0" encoding="utf-8"?>
 <p:sldLayout xmlns:a="http://schemas.openxmlformats.org/drawingml/2006/main" xmlns:r="http://schemas.openxmlformats.org/officeDocument/2006/relationships" xmlns:p="http://schemas.openxmlformats.org/presentationml/2006/main" type="twoTxTwoObj" preserve="1">
-  <p:cSld name="Porovnanie">
+  <p:cSld name="Vergelijking">
     <p:spTree>
       <p:nvGrpSpPr>
         <p:cNvPr id="1" name=""/>
@@ -1757,7 +1757,7 @@
       </p:grpSpPr>
       <p:sp>
         <p:nvSpPr>
-          <p:cNvPr id="2" name="Nadpis 1"/>
+          <p:cNvPr id="2" name="Titel 1"/>
           <p:cNvSpPr>
             <a:spLocks noGrp="1"/>
           </p:cNvSpPr>
@@ -1777,14 +1777,14 @@
           <a:p>
             <a:r>
               <a:rPr lang="nl-NL"/>
-              <a:t>Upravte štýly predlohy textu</a:t>
-            </a:r>
-          </a:p>
-        </p:txBody>
-      </p:sp>
-      <p:sp>
-        <p:nvSpPr>
-          <p:cNvPr id="3" name="Zástupný symbol textu 2"/>
+              <a:t>Klik om de stijl te bewerken</a:t>
+            </a:r>
+          </a:p>
+        </p:txBody>
+      </p:sp>
+      <p:sp>
+        <p:nvSpPr>
+          <p:cNvPr id="3" name="Tijdelijke aanduiding voor tekst 2"/>
           <p:cNvSpPr>
             <a:spLocks noGrp="1"/>
           </p:cNvSpPr>
@@ -1842,14 +1842,14 @@
             <a:pPr lvl="0"/>
             <a:r>
               <a:rPr lang="nl-NL"/>
-              <a:t>Upravte štýl predlohy textu.</a:t>
-            </a:r>
-          </a:p>
-        </p:txBody>
-      </p:sp>
-      <p:sp>
-        <p:nvSpPr>
-          <p:cNvPr id="4" name="Zástupný symbol obsahu 3"/>
+              <a:t>Klik om de modelstijlen te bewerken</a:t>
+            </a:r>
+          </a:p>
+        </p:txBody>
+      </p:sp>
+      <p:sp>
+        <p:nvSpPr>
+          <p:cNvPr id="4" name="Tijdelijke aanduiding voor inhoud 3"/>
           <p:cNvSpPr>
             <a:spLocks noGrp="1"/>
           </p:cNvSpPr>
@@ -1870,42 +1870,42 @@
             <a:pPr lvl="0"/>
             <a:r>
               <a:rPr lang="nl-NL"/>
-              <a:t>Upravte štýl predlohy textu.</a:t>
+              <a:t>Klik om de modelstijlen te bewerken</a:t>
             </a:r>
           </a:p>
           <a:p>
             <a:pPr lvl="1"/>
             <a:r>
               <a:rPr lang="nl-NL"/>
-              <a:t>Druhá úroveň</a:t>
+              <a:t>Tweede niveau</a:t>
             </a:r>
           </a:p>
           <a:p>
             <a:pPr lvl="2"/>
             <a:r>
               <a:rPr lang="nl-NL"/>
-              <a:t>Tretia úroveň</a:t>
+              <a:t>Derde niveau</a:t>
             </a:r>
           </a:p>
           <a:p>
             <a:pPr lvl="3"/>
             <a:r>
               <a:rPr lang="nl-NL"/>
-              <a:t>Štvrtá úroveň</a:t>
+              <a:t>Vierde niveau</a:t>
             </a:r>
           </a:p>
           <a:p>
             <a:pPr lvl="4"/>
             <a:r>
               <a:rPr lang="nl-NL"/>
-              <a:t>Piata úroveň</a:t>
-            </a:r>
-          </a:p>
-        </p:txBody>
-      </p:sp>
-      <p:sp>
-        <p:nvSpPr>
-          <p:cNvPr id="5" name="Zástupný symbol textu 4"/>
+              <a:t>Vijfde niveau</a:t>
+            </a:r>
+          </a:p>
+        </p:txBody>
+      </p:sp>
+      <p:sp>
+        <p:nvSpPr>
+          <p:cNvPr id="5" name="Tijdelijke aanduiding voor tekst 4"/>
           <p:cNvSpPr>
             <a:spLocks noGrp="1"/>
           </p:cNvSpPr>
@@ -1963,14 +1963,14 @@
             <a:pPr lvl="0"/>
             <a:r>
               <a:rPr lang="nl-NL"/>
-              <a:t>Upravte štýl predlohy textu.</a:t>
-            </a:r>
-          </a:p>
-        </p:txBody>
-      </p:sp>
-      <p:sp>
-        <p:nvSpPr>
-          <p:cNvPr id="6" name="Zástupný symbol obsahu 5"/>
+              <a:t>Klik om de modelstijlen te bewerken</a:t>
+            </a:r>
+          </a:p>
+        </p:txBody>
+      </p:sp>
+      <p:sp>
+        <p:nvSpPr>
+          <p:cNvPr id="6" name="Tijdelijke aanduiding voor inhoud 5"/>
           <p:cNvSpPr>
             <a:spLocks noGrp="1"/>
           </p:cNvSpPr>
@@ -1991,42 +1991,42 @@
             <a:pPr lvl="0"/>
             <a:r>
               <a:rPr lang="nl-NL"/>
-              <a:t>Upravte štýl predlohy textu.</a:t>
+              <a:t>Klik om de modelstijlen te bewerken</a:t>
             </a:r>
           </a:p>
           <a:p>
             <a:pPr lvl="1"/>
             <a:r>
               <a:rPr lang="nl-NL"/>
-              <a:t>Druhá úroveň</a:t>
+              <a:t>Tweede niveau</a:t>
             </a:r>
           </a:p>
           <a:p>
             <a:pPr lvl="2"/>
             <a:r>
               <a:rPr lang="nl-NL"/>
-              <a:t>Tretia úroveň</a:t>
+              <a:t>Derde niveau</a:t>
             </a:r>
           </a:p>
           <a:p>
             <a:pPr lvl="3"/>
             <a:r>
               <a:rPr lang="nl-NL"/>
-              <a:t>Štvrtá úroveň</a:t>
+              <a:t>Vierde niveau</a:t>
             </a:r>
           </a:p>
           <a:p>
             <a:pPr lvl="4"/>
             <a:r>
               <a:rPr lang="nl-NL"/>
-              <a:t>Piata úroveň</a:t>
-            </a:r>
-          </a:p>
-        </p:txBody>
-      </p:sp>
-      <p:sp>
-        <p:nvSpPr>
-          <p:cNvPr id="7" name="Zástupný symbol dátumu 6"/>
+              <a:t>Vijfde niveau</a:t>
+            </a:r>
+          </a:p>
+        </p:txBody>
+      </p:sp>
+      <p:sp>
+        <p:nvSpPr>
+          <p:cNvPr id="7" name="Tijdelijke aanduiding voor datum 6"/>
           <p:cNvSpPr>
             <a:spLocks noGrp="1"/>
           </p:cNvSpPr>
@@ -2049,7 +2049,7 @@
       </p:sp>
       <p:sp>
         <p:nvSpPr>
-          <p:cNvPr id="8" name="Zástupný symbol päty 7"/>
+          <p:cNvPr id="8" name="Tijdelijke aanduiding voor voettekst 7"/>
           <p:cNvSpPr>
             <a:spLocks noGrp="1"/>
           </p:cNvSpPr>
@@ -2068,7 +2068,7 @@
       </p:sp>
       <p:sp>
         <p:nvSpPr>
-          <p:cNvPr id="9" name="Zástupný symbol čísla snímky 8"/>
+          <p:cNvPr id="9" name="Tijdelijke aanduiding voor dianummer 8"/>
           <p:cNvSpPr>
             <a:spLocks noGrp="1"/>
           </p:cNvSpPr>
@@ -2104,7 +2104,7 @@
 
 <file path=ppt/slideLayouts/slideLayout6.xml><?xml version="1.0" encoding="utf-8"?>
 <p:sldLayout xmlns:a="http://schemas.openxmlformats.org/drawingml/2006/main" xmlns:r="http://schemas.openxmlformats.org/officeDocument/2006/relationships" xmlns:p="http://schemas.openxmlformats.org/presentationml/2006/main" type="titleOnly" preserve="1">
-  <p:cSld name="Len nadpis">
+  <p:cSld name="Alleen titel">
     <p:spTree>
       <p:nvGrpSpPr>
         <p:cNvPr id="1" name=""/>
@@ -2121,7 +2121,7 @@
       </p:grpSpPr>
       <p:sp>
         <p:nvSpPr>
-          <p:cNvPr id="2" name="Nadpis 1"/>
+          <p:cNvPr id="2" name="Titel 1"/>
           <p:cNvSpPr>
             <a:spLocks noGrp="1"/>
           </p:cNvSpPr>
@@ -2136,14 +2136,14 @@
           <a:p>
             <a:r>
               <a:rPr lang="nl-NL"/>
-              <a:t>Upravte štýly predlohy textu</a:t>
-            </a:r>
-          </a:p>
-        </p:txBody>
-      </p:sp>
-      <p:sp>
-        <p:nvSpPr>
-          <p:cNvPr id="3" name="Zástupný symbol dátumu 2"/>
+              <a:t>Klik om de stijl te bewerken</a:t>
+            </a:r>
+          </a:p>
+        </p:txBody>
+      </p:sp>
+      <p:sp>
+        <p:nvSpPr>
+          <p:cNvPr id="3" name="Tijdelijke aanduiding voor datum 2"/>
           <p:cNvSpPr>
             <a:spLocks noGrp="1"/>
           </p:cNvSpPr>
@@ -2166,7 +2166,7 @@
       </p:sp>
       <p:sp>
         <p:nvSpPr>
-          <p:cNvPr id="4" name="Zástupný symbol päty 3"/>
+          <p:cNvPr id="4" name="Tijdelijke aanduiding voor voettekst 3"/>
           <p:cNvSpPr>
             <a:spLocks noGrp="1"/>
           </p:cNvSpPr>
@@ -2185,7 +2185,7 @@
       </p:sp>
       <p:sp>
         <p:nvSpPr>
-          <p:cNvPr id="5" name="Zástupný symbol čísla snímky 4"/>
+          <p:cNvPr id="5" name="Tijdelijke aanduiding voor dianummer 4"/>
           <p:cNvSpPr>
             <a:spLocks noGrp="1"/>
           </p:cNvSpPr>
@@ -2221,7 +2221,7 @@
 
 <file path=ppt/slideLayouts/slideLayout7.xml><?xml version="1.0" encoding="utf-8"?>
 <p:sldLayout xmlns:a="http://schemas.openxmlformats.org/drawingml/2006/main" xmlns:r="http://schemas.openxmlformats.org/officeDocument/2006/relationships" xmlns:p="http://schemas.openxmlformats.org/presentationml/2006/main" type="blank" preserve="1">
-  <p:cSld name="Prázdna">
+  <p:cSld name="Leeg">
     <p:spTree>
       <p:nvGrpSpPr>
         <p:cNvPr id="1" name=""/>
@@ -2238,7 +2238,7 @@
       </p:grpSpPr>
       <p:sp>
         <p:nvSpPr>
-          <p:cNvPr id="2" name="Zástupný symbol dátumu 1"/>
+          <p:cNvPr id="2" name="Tijdelijke aanduiding voor datum 1"/>
           <p:cNvSpPr>
             <a:spLocks noGrp="1"/>
           </p:cNvSpPr>
@@ -2261,7 +2261,7 @@
       </p:sp>
       <p:sp>
         <p:nvSpPr>
-          <p:cNvPr id="3" name="Zástupný symbol päty 2"/>
+          <p:cNvPr id="3" name="Tijdelijke aanduiding voor voettekst 2"/>
           <p:cNvSpPr>
             <a:spLocks noGrp="1"/>
           </p:cNvSpPr>
@@ -2280,7 +2280,7 @@
       </p:sp>
       <p:sp>
         <p:nvSpPr>
-          <p:cNvPr id="4" name="Zástupný symbol čísla snímky 3"/>
+          <p:cNvPr id="4" name="Tijdelijke aanduiding voor dianummer 3"/>
           <p:cNvSpPr>
             <a:spLocks noGrp="1"/>
           </p:cNvSpPr>
@@ -2316,7 +2316,7 @@
 
 <file path=ppt/slideLayouts/slideLayout8.xml><?xml version="1.0" encoding="utf-8"?>
 <p:sldLayout xmlns:a="http://schemas.openxmlformats.org/drawingml/2006/main" xmlns:r="http://schemas.openxmlformats.org/officeDocument/2006/relationships" xmlns:p="http://schemas.openxmlformats.org/presentationml/2006/main" type="objTx" preserve="1">
-  <p:cSld name="Obsah s popisom">
+  <p:cSld name="Inhoud met bijschrift">
     <p:spTree>
       <p:nvGrpSpPr>
         <p:cNvPr id="1" name=""/>
@@ -2333,7 +2333,7 @@
       </p:grpSpPr>
       <p:sp>
         <p:nvSpPr>
-          <p:cNvPr id="2" name="Nadpis 1"/>
+          <p:cNvPr id="2" name="Titel 1"/>
           <p:cNvSpPr>
             <a:spLocks noGrp="1"/>
           </p:cNvSpPr>
@@ -2357,14 +2357,14 @@
           <a:p>
             <a:r>
               <a:rPr lang="nl-NL"/>
-              <a:t>Upravte štýly predlohy textu</a:t>
-            </a:r>
-          </a:p>
-        </p:txBody>
-      </p:sp>
-      <p:sp>
-        <p:nvSpPr>
-          <p:cNvPr id="3" name="Zástupný symbol obsahu 2"/>
+              <a:t>Klik om de stijl te bewerken</a:t>
+            </a:r>
+          </a:p>
+        </p:txBody>
+      </p:sp>
+      <p:sp>
+        <p:nvSpPr>
+          <p:cNvPr id="3" name="Tijdelijke aanduiding voor inhoud 2"/>
           <p:cNvSpPr>
             <a:spLocks noGrp="1"/>
           </p:cNvSpPr>
@@ -2413,42 +2413,42 @@
             <a:pPr lvl="0"/>
             <a:r>
               <a:rPr lang="nl-NL"/>
-              <a:t>Upravte štýl predlohy textu.</a:t>
+              <a:t>Klik om de modelstijlen te bewerken</a:t>
             </a:r>
           </a:p>
           <a:p>
             <a:pPr lvl="1"/>
             <a:r>
               <a:rPr lang="nl-NL"/>
-              <a:t>Druhá úroveň</a:t>
+              <a:t>Tweede niveau</a:t>
             </a:r>
           </a:p>
           <a:p>
             <a:pPr lvl="2"/>
             <a:r>
               <a:rPr lang="nl-NL"/>
-              <a:t>Tretia úroveň</a:t>
+              <a:t>Derde niveau</a:t>
             </a:r>
           </a:p>
           <a:p>
             <a:pPr lvl="3"/>
             <a:r>
               <a:rPr lang="nl-NL"/>
-              <a:t>Štvrtá úroveň</a:t>
+              <a:t>Vierde niveau</a:t>
             </a:r>
           </a:p>
           <a:p>
             <a:pPr lvl="4"/>
             <a:r>
               <a:rPr lang="nl-NL"/>
-              <a:t>Piata úroveň</a:t>
-            </a:r>
-          </a:p>
-        </p:txBody>
-      </p:sp>
-      <p:sp>
-        <p:nvSpPr>
-          <p:cNvPr id="4" name="Zástupný symbol textu 3"/>
+              <a:t>Vijfde niveau</a:t>
+            </a:r>
+          </a:p>
+        </p:txBody>
+      </p:sp>
+      <p:sp>
+        <p:nvSpPr>
+          <p:cNvPr id="4" name="Tijdelijke aanduiding voor tekst 3"/>
           <p:cNvSpPr>
             <a:spLocks noGrp="1"/>
           </p:cNvSpPr>
@@ -2506,14 +2506,14 @@
             <a:pPr lvl="0"/>
             <a:r>
               <a:rPr lang="nl-NL"/>
-              <a:t>Upravte štýl predlohy textu.</a:t>
-            </a:r>
-          </a:p>
-        </p:txBody>
-      </p:sp>
-      <p:sp>
-        <p:nvSpPr>
-          <p:cNvPr id="5" name="Zástupný symbol dátumu 4"/>
+              <a:t>Klik om de modelstijlen te bewerken</a:t>
+            </a:r>
+          </a:p>
+        </p:txBody>
+      </p:sp>
+      <p:sp>
+        <p:nvSpPr>
+          <p:cNvPr id="5" name="Tijdelijke aanduiding voor datum 4"/>
           <p:cNvSpPr>
             <a:spLocks noGrp="1"/>
           </p:cNvSpPr>
@@ -2536,7 +2536,7 @@
       </p:sp>
       <p:sp>
         <p:nvSpPr>
-          <p:cNvPr id="6" name="Zástupný symbol päty 5"/>
+          <p:cNvPr id="6" name="Tijdelijke aanduiding voor voettekst 5"/>
           <p:cNvSpPr>
             <a:spLocks noGrp="1"/>
           </p:cNvSpPr>
@@ -2555,7 +2555,7 @@
       </p:sp>
       <p:sp>
         <p:nvSpPr>
-          <p:cNvPr id="7" name="Zástupný symbol čísla snímky 6"/>
+          <p:cNvPr id="7" name="Tijdelijke aanduiding voor dianummer 6"/>
           <p:cNvSpPr>
             <a:spLocks noGrp="1"/>
           </p:cNvSpPr>
@@ -2591,7 +2591,7 @@
 
 <file path=ppt/slideLayouts/slideLayout9.xml><?xml version="1.0" encoding="utf-8"?>
 <p:sldLayout xmlns:a="http://schemas.openxmlformats.org/drawingml/2006/main" xmlns:r="http://schemas.openxmlformats.org/officeDocument/2006/relationships" xmlns:p="http://schemas.openxmlformats.org/presentationml/2006/main" type="picTx" preserve="1">
-  <p:cSld name="Obrázok s popisom">
+  <p:cSld name="Afbeelding met bijschrift">
     <p:spTree>
       <p:nvGrpSpPr>
         <p:cNvPr id="1" name=""/>
@@ -2608,7 +2608,7 @@
       </p:grpSpPr>
       <p:sp>
         <p:nvSpPr>
-          <p:cNvPr id="2" name="Nadpis 1"/>
+          <p:cNvPr id="2" name="Titel 1"/>
           <p:cNvSpPr>
             <a:spLocks noGrp="1"/>
           </p:cNvSpPr>
@@ -2632,14 +2632,14 @@
           <a:p>
             <a:r>
               <a:rPr lang="nl-NL"/>
-              <a:t>Upravte štýly predlohy textu</a:t>
-            </a:r>
-          </a:p>
-        </p:txBody>
-      </p:sp>
-      <p:sp>
-        <p:nvSpPr>
-          <p:cNvPr id="3" name="Zástupný symbol obrázka 2"/>
+              <a:t>Klik om de stijl te bewerken</a:t>
+            </a:r>
+          </a:p>
+        </p:txBody>
+      </p:sp>
+      <p:sp>
+        <p:nvSpPr>
+          <p:cNvPr id="3" name="Tijdelijke aanduiding voor afbeelding 2"/>
           <p:cNvSpPr>
             <a:spLocks noGrp="1"/>
           </p:cNvSpPr>
@@ -2700,7 +2700,7 @@
       </p:sp>
       <p:sp>
         <p:nvSpPr>
-          <p:cNvPr id="4" name="Zástupný symbol textu 3"/>
+          <p:cNvPr id="4" name="Tijdelijke aanduiding voor tekst 3"/>
           <p:cNvSpPr>
             <a:spLocks noGrp="1"/>
           </p:cNvSpPr>
@@ -2758,14 +2758,14 @@
             <a:pPr lvl="0"/>
             <a:r>
               <a:rPr lang="nl-NL"/>
-              <a:t>Upravte štýl predlohy textu.</a:t>
-            </a:r>
-          </a:p>
-        </p:txBody>
-      </p:sp>
-      <p:sp>
-        <p:nvSpPr>
-          <p:cNvPr id="5" name="Zástupný symbol dátumu 4"/>
+              <a:t>Klik om de modelstijlen te bewerken</a:t>
+            </a:r>
+          </a:p>
+        </p:txBody>
+      </p:sp>
+      <p:sp>
+        <p:nvSpPr>
+          <p:cNvPr id="5" name="Tijdelijke aanduiding voor datum 4"/>
           <p:cNvSpPr>
             <a:spLocks noGrp="1"/>
           </p:cNvSpPr>
@@ -2788,7 +2788,7 @@
       </p:sp>
       <p:sp>
         <p:nvSpPr>
-          <p:cNvPr id="6" name="Zástupný symbol päty 5"/>
+          <p:cNvPr id="6" name="Tijdelijke aanduiding voor voettekst 5"/>
           <p:cNvSpPr>
             <a:spLocks noGrp="1"/>
           </p:cNvSpPr>
@@ -2807,7 +2807,7 @@
       </p:sp>
       <p:sp>
         <p:nvSpPr>
-          <p:cNvPr id="7" name="Zástupný symbol čísla snímky 6"/>
+          <p:cNvPr id="7" name="Tijdelijke aanduiding voor dianummer 6"/>
           <p:cNvSpPr>
             <a:spLocks noGrp="1"/>
           </p:cNvSpPr>
@@ -2865,7 +2865,7 @@
       </p:grpSpPr>
       <p:sp>
         <p:nvSpPr>
-          <p:cNvPr id="2" name="Zástupný symbol nadpisu 1"/>
+          <p:cNvPr id="2" name="Tijdelijke aanduiding voor titel 1"/>
           <p:cNvSpPr>
             <a:spLocks noGrp="1"/>
           </p:cNvSpPr>
@@ -2897,7 +2897,7 @@
       </p:sp>
       <p:sp>
         <p:nvSpPr>
-          <p:cNvPr id="3" name="Zástupný symbol textu 2"/>
+          <p:cNvPr id="3" name="Tijdelijke aanduiding voor tekst 2"/>
           <p:cNvSpPr>
             <a:spLocks noGrp="1"/>
           </p:cNvSpPr>
@@ -2923,42 +2923,42 @@
             <a:pPr lvl="0"/>
             <a:r>
               <a:rPr lang="nl-NL"/>
-              <a:t>Upravte štýl predlohy textu.</a:t>
+              <a:t>Klik om de modelstijlen te bewerken</a:t>
             </a:r>
           </a:p>
           <a:p>
             <a:pPr lvl="1"/>
             <a:r>
               <a:rPr lang="nl-NL"/>
-              <a:t>Druhá úroveň</a:t>
+              <a:t>Tweede niveau</a:t>
             </a:r>
           </a:p>
           <a:p>
             <a:pPr lvl="2"/>
             <a:r>
               <a:rPr lang="nl-NL"/>
-              <a:t>Tretia úroveň</a:t>
+              <a:t>Derde niveau</a:t>
             </a:r>
           </a:p>
           <a:p>
             <a:pPr lvl="3"/>
             <a:r>
               <a:rPr lang="nl-NL"/>
-              <a:t>Štvrtá úroveň</a:t>
+              <a:t>Vierde niveau</a:t>
             </a:r>
           </a:p>
           <a:p>
             <a:pPr lvl="4"/>
             <a:r>
               <a:rPr lang="nl-NL"/>
-              <a:t>Piata úroveň</a:t>
-            </a:r>
-          </a:p>
-        </p:txBody>
-      </p:sp>
-      <p:sp>
-        <p:nvSpPr>
-          <p:cNvPr id="4" name="Zástupný symbol dátumu 3"/>
+              <a:t>Vijfde niveau</a:t>
+            </a:r>
+          </a:p>
+        </p:txBody>
+      </p:sp>
+      <p:sp>
+        <p:nvSpPr>
+          <p:cNvPr id="4" name="Tijdelijke aanduiding voor datum 3"/>
           <p:cNvSpPr>
             <a:spLocks noGrp="1"/>
           </p:cNvSpPr>
@@ -2999,7 +2999,7 @@
       </p:sp>
       <p:sp>
         <p:nvSpPr>
-          <p:cNvPr id="5" name="Zástupný symbol päty 4"/>
+          <p:cNvPr id="5" name="Tijdelijke aanduiding voor voettekst 4"/>
           <p:cNvSpPr>
             <a:spLocks noGrp="1"/>
           </p:cNvSpPr>
@@ -3036,7 +3036,7 @@
       </p:sp>
       <p:sp>
         <p:nvSpPr>
-          <p:cNvPr id="6" name="Zástupný symbol čísla snímky 5"/>
+          <p:cNvPr id="6" name="Tijdelijke aanduiding voor dianummer 5"/>
           <p:cNvSpPr>
             <a:spLocks noGrp="1"/>
           </p:cNvSpPr>
@@ -3398,7 +3398,7 @@
       </p:grpSpPr>
       <p:sp>
         <p:nvSpPr>
-          <p:cNvPr id="2" name="Title 1"/>
+          <p:cNvPr id="2" name="Titel 1"/>
           <p:cNvSpPr>
             <a:spLocks noGrp="1"/>
           </p:cNvSpPr>
@@ -3417,7 +3417,7 @@
       </p:sp>
       <p:sp>
         <p:nvSpPr>
-          <p:cNvPr id="3" name="Subtitle 2"/>
+          <p:cNvPr id="3" name="Ondertitel 2"/>
           <p:cNvSpPr>
             <a:spLocks noGrp="1"/>
           </p:cNvSpPr>

</xml_diff>